<commit_message>
make nimh_proj smaller, edit some poster language
</commit_message>
<xml_diff>
--- a/ohbm_2020.pptx
+++ b/ohbm_2020.pptx
@@ -3862,8 +3862,13 @@
               </a:pPr>
               <a:r>
                 <a:rPr lang="en-US" sz="3000" dirty="0"/>
-                <a:t>We developed a series of classification systems to identify data statements</a:t>
+                <a:t>We developed a series of classification systems to identify data sharing/</a:t>
               </a:r>
+              <a:r>
+                <a:rPr lang="en-US" sz="3000"/>
+                <a:t>reuse statements</a:t>
+              </a:r>
+              <a:endParaRPr lang="en-US" sz="3000" dirty="0"/>
             </a:p>
             <a:p>
               <a:pPr marL="285750" indent="-285750">
@@ -4270,7 +4275,7 @@
           </p:nvSpPr>
           <p:spPr>
             <a:xfrm>
-              <a:off x="9210024" y="7836637"/>
+              <a:off x="9210024" y="7725801"/>
               <a:ext cx="7706376" cy="6370975"/>
             </a:xfrm>
             <a:prstGeom prst="rect">
@@ -4402,10 +4407,10 @@
           </p:nvGrpSpPr>
           <p:grpSpPr>
             <a:xfrm>
-              <a:off x="9155193" y="13928178"/>
-              <a:ext cx="7414679" cy="4523969"/>
-              <a:chOff x="9216493" y="13141545"/>
-              <a:chExt cx="7414679" cy="4523969"/>
+              <a:off x="9252835" y="14023977"/>
+              <a:ext cx="7317037" cy="4523969"/>
+              <a:chOff x="9314135" y="13237344"/>
+              <a:chExt cx="7317037" cy="4523969"/>
             </a:xfrm>
           </p:grpSpPr>
           <p:sp>
@@ -4422,7 +4427,7 @@
             </p:nvSpPr>
             <p:spPr>
               <a:xfrm>
-                <a:off x="9765183" y="13141545"/>
+                <a:off x="9765183" y="13237344"/>
                 <a:ext cx="5432138" cy="592111"/>
               </a:xfrm>
               <a:prstGeom prst="rect">
@@ -4473,7 +4478,7 @@
             </p:nvCxnSpPr>
             <p:spPr>
               <a:xfrm>
-                <a:off x="10597490" y="13559221"/>
+                <a:off x="10597490" y="13655020"/>
                 <a:ext cx="0" cy="433230"/>
               </a:xfrm>
               <a:prstGeom prst="straightConnector1">
@@ -4514,7 +4519,7 @@
             </p:nvCxnSpPr>
             <p:spPr>
               <a:xfrm>
-                <a:off x="14349662" y="13559221"/>
+                <a:off x="14349662" y="13655020"/>
                 <a:ext cx="0" cy="454496"/>
               </a:xfrm>
               <a:prstGeom prst="straightConnector1">
@@ -4553,7 +4558,7 @@
             </p:nvSpPr>
             <p:spPr>
               <a:xfrm>
-                <a:off x="9216493" y="15287166"/>
+                <a:off x="9408091" y="15382965"/>
                 <a:ext cx="2422866" cy="837041"/>
               </a:xfrm>
               <a:prstGeom prst="ellipse">
@@ -4607,7 +4612,7 @@
             </p:nvCxnSpPr>
             <p:spPr>
               <a:xfrm>
-                <a:off x="10627690" y="14865588"/>
+                <a:off x="10627690" y="14961387"/>
                 <a:ext cx="0" cy="424035"/>
               </a:xfrm>
               <a:prstGeom prst="straightConnector1">
@@ -4646,7 +4651,7 @@
             </p:nvSpPr>
             <p:spPr>
               <a:xfrm>
-                <a:off x="9314135" y="13992452"/>
+                <a:off x="9314135" y="14088251"/>
                 <a:ext cx="2569074" cy="877038"/>
               </a:xfrm>
               <a:prstGeom prst="triangle">
@@ -4702,7 +4707,7 @@
             </p:nvSpPr>
             <p:spPr>
               <a:xfrm>
-                <a:off x="13132969" y="13998958"/>
+                <a:off x="13132969" y="14094757"/>
                 <a:ext cx="2505762" cy="877038"/>
               </a:xfrm>
               <a:prstGeom prst="triangle">
@@ -4760,7 +4765,7 @@
             </p:nvCxnSpPr>
             <p:spPr>
               <a:xfrm>
-                <a:off x="14349662" y="14908485"/>
+                <a:off x="14349662" y="15004284"/>
                 <a:ext cx="0" cy="423668"/>
               </a:xfrm>
               <a:prstGeom prst="straightConnector1">
@@ -4799,7 +4804,7 @@
             </p:nvSpPr>
             <p:spPr>
               <a:xfrm>
-                <a:off x="12465314" y="15350345"/>
+                <a:off x="12465314" y="15446144"/>
                 <a:ext cx="3924909" cy="1033105"/>
               </a:xfrm>
               <a:prstGeom prst="rect">
@@ -4850,7 +4855,7 @@
             </p:nvCxnSpPr>
             <p:spPr>
               <a:xfrm>
-                <a:off x="14349662" y="16388371"/>
+                <a:off x="14349662" y="16484170"/>
                 <a:ext cx="0" cy="454496"/>
               </a:xfrm>
               <a:prstGeom prst="straightConnector1">
@@ -4889,7 +4894,7 @@
             </p:nvSpPr>
             <p:spPr>
               <a:xfrm>
-                <a:off x="13044398" y="16788476"/>
+                <a:off x="13044398" y="16884275"/>
                 <a:ext cx="2585460" cy="877038"/>
               </a:xfrm>
               <a:prstGeom prst="triangle">
@@ -4948,7 +4953,7 @@
             </p:nvCxnSpPr>
             <p:spPr>
               <a:xfrm flipH="1">
-                <a:off x="11700802" y="17226995"/>
+                <a:off x="11700802" y="17322794"/>
                 <a:ext cx="1989961" cy="0"/>
               </a:xfrm>
               <a:prstGeom prst="straightConnector1">
@@ -4987,7 +4992,7 @@
             </p:nvSpPr>
             <p:spPr>
               <a:xfrm>
-                <a:off x="15468609" y="13173998"/>
+                <a:off x="15468609" y="13269797"/>
                 <a:ext cx="1098955" cy="400110"/>
               </a:xfrm>
               <a:prstGeom prst="rect">
@@ -5026,7 +5031,7 @@
             </p:nvSpPr>
             <p:spPr>
               <a:xfrm>
-                <a:off x="15487910" y="14183946"/>
+                <a:off x="15487910" y="14279745"/>
                 <a:ext cx="1143262" cy="400110"/>
               </a:xfrm>
               <a:prstGeom prst="rect">
@@ -5840,7 +5845,7 @@
         </p:nvSpPr>
         <p:spPr>
           <a:xfrm>
-            <a:off x="9155193" y="17361747"/>
+            <a:off x="9207447" y="17544636"/>
             <a:ext cx="2424823" cy="837041"/>
           </a:xfrm>
           <a:prstGeom prst="ellipse">

</xml_diff>